<commit_message>
Moved imports out of user data into runPython.py
</commit_message>
<xml_diff>
--- a/test/codetest.pptx
+++ b/test/codetest.pptx
@@ -355,7 +355,7 @@
       </c:valAx>
     </c:plotArea>
     <c:legend>
-      <c:legendPos/>
+      <c:legendPos val="b"/>
       <c:overlay val="0"/>
     </c:legend>
     <c:dispBlanksAs val="gap"/>
@@ -3926,7 +3926,7 @@
               <a:defRPr sz="3000"/>
             </a:pPr>
             <a:r>
-              <a:t>Presentation built: 17:24 on 2 June, 2024</a:t>
+              <a:t>Presentation built: 15:43 on 9 June, 2024</a:t>
             </a:r>
           </a:p>
         </p:txBody>

</xml_diff>